<commit_message>
Added FPGA specific stuff
</commit_message>
<xml_diff>
--- a/Slides/Hands_on_with_FPGA's_Module_5.pptx
+++ b/Slides/Hands_on_with_FPGA's_Module_5.pptx
@@ -6263,7 +6263,7 @@
         <p:spPr>
           <a:xfrm>
             <a:off x="3933761" y="2267589"/>
-            <a:ext cx="1110781" cy="276999"/>
+            <a:ext cx="1110781" cy="461665"/>
           </a:xfrm>
           <a:prstGeom prst="rect">
             <a:avLst/>
@@ -6282,7 +6282,7 @@
                   <a:srgbClr val="FF0000"/>
                 </a:solidFill>
               </a:rPr>
-              <a:t>Cost/Speed</a:t>
+              <a:t>Size, Cost, Speed</a:t>
             </a:r>
           </a:p>
         </p:txBody>
@@ -6364,7 +6364,7 @@
                   <a:srgbClr val="FF0000"/>
                 </a:solidFill>
               </a:rPr>
-              <a:t>Size/Energy</a:t>
+              <a:t>Energy</a:t>
             </a:r>
           </a:p>
         </p:txBody>

</xml_diff>